<commit_message>
moar moar updated slides
</commit_message>
<xml_diff>
--- a/gab-2016-sf.pptx
+++ b/gab-2016-sf.pptx
@@ -529,7 +529,7 @@
           <a:p>
             <a:fld id="{E6651C44-F3AD-4161-8DF3-824F5EC2D0F3}" type="datetimeFigureOut">
               <a:rPr lang="en-US" smtClean="0"/>
-              <a:t>4/13/2016</a:t>
+              <a:t>4/15/2016</a:t>
             </a:fld>
             <a:endParaRPr lang="en-US"/>
           </a:p>
@@ -708,7 +708,7 @@
           <a:p>
             <a:fld id="{E6651C44-F3AD-4161-8DF3-824F5EC2D0F3}" type="datetimeFigureOut">
               <a:rPr lang="en-US" smtClean="0"/>
-              <a:t>4/13/2016</a:t>
+              <a:t>4/15/2016</a:t>
             </a:fld>
             <a:endParaRPr lang="en-US"/>
           </a:p>
@@ -888,7 +888,7 @@
           <a:p>
             <a:fld id="{E6651C44-F3AD-4161-8DF3-824F5EC2D0F3}" type="datetimeFigureOut">
               <a:rPr lang="en-US" smtClean="0"/>
-              <a:t>4/13/2016</a:t>
+              <a:t>4/15/2016</a:t>
             </a:fld>
             <a:endParaRPr lang="en-US"/>
           </a:p>
@@ -1058,7 +1058,7 @@
           <a:p>
             <a:fld id="{E6651C44-F3AD-4161-8DF3-824F5EC2D0F3}" type="datetimeFigureOut">
               <a:rPr lang="en-US" smtClean="0"/>
-              <a:t>4/13/2016</a:t>
+              <a:t>4/15/2016</a:t>
             </a:fld>
             <a:endParaRPr lang="en-US"/>
           </a:p>
@@ -1371,7 +1371,7 @@
           <a:p>
             <a:fld id="{E6651C44-F3AD-4161-8DF3-824F5EC2D0F3}" type="datetimeFigureOut">
               <a:rPr lang="en-US" smtClean="0"/>
-              <a:t>4/13/2016</a:t>
+              <a:t>4/15/2016</a:t>
             </a:fld>
             <a:endParaRPr lang="en-US"/>
           </a:p>
@@ -1757,7 +1757,7 @@
           <a:p>
             <a:fld id="{E6651C44-F3AD-4161-8DF3-824F5EC2D0F3}" type="datetimeFigureOut">
               <a:rPr lang="en-US" smtClean="0"/>
-              <a:t>4/13/2016</a:t>
+              <a:t>4/15/2016</a:t>
             </a:fld>
             <a:endParaRPr lang="en-US"/>
           </a:p>
@@ -2191,7 +2191,7 @@
           <a:p>
             <a:fld id="{E6651C44-F3AD-4161-8DF3-824F5EC2D0F3}" type="datetimeFigureOut">
               <a:rPr lang="en-US" smtClean="0"/>
-              <a:t>4/13/2016</a:t>
+              <a:t>4/15/2016</a:t>
             </a:fld>
             <a:endParaRPr lang="en-US"/>
           </a:p>
@@ -2309,7 +2309,7 @@
           <a:p>
             <a:fld id="{E6651C44-F3AD-4161-8DF3-824F5EC2D0F3}" type="datetimeFigureOut">
               <a:rPr lang="en-US" smtClean="0"/>
-              <a:t>4/13/2016</a:t>
+              <a:t>4/15/2016</a:t>
             </a:fld>
             <a:endParaRPr lang="en-US"/>
           </a:p>
@@ -2404,7 +2404,7 @@
           <a:p>
             <a:fld id="{E6651C44-F3AD-4161-8DF3-824F5EC2D0F3}" type="datetimeFigureOut">
               <a:rPr lang="en-US" smtClean="0"/>
-              <a:t>4/13/2016</a:t>
+              <a:t>4/15/2016</a:t>
             </a:fld>
             <a:endParaRPr lang="en-US"/>
           </a:p>
@@ -2754,7 +2754,7 @@
           <a:p>
             <a:fld id="{E6651C44-F3AD-4161-8DF3-824F5EC2D0F3}" type="datetimeFigureOut">
               <a:rPr lang="en-US" smtClean="0"/>
-              <a:t>4/13/2016</a:t>
+              <a:t>4/15/2016</a:t>
             </a:fld>
             <a:endParaRPr lang="en-US"/>
           </a:p>
@@ -3179,7 +3179,7 @@
           <a:p>
             <a:fld id="{E6651C44-F3AD-4161-8DF3-824F5EC2D0F3}" type="datetimeFigureOut">
               <a:rPr lang="en-US" smtClean="0"/>
-              <a:t>4/13/2016</a:t>
+              <a:t>4/15/2016</a:t>
             </a:fld>
             <a:endParaRPr lang="en-US"/>
           </a:p>
@@ -3460,7 +3460,7 @@
           <a:p>
             <a:fld id="{E6651C44-F3AD-4161-8DF3-824F5EC2D0F3}" type="datetimeFigureOut">
               <a:rPr lang="en-US" smtClean="0"/>
-              <a:t>4/13/2016</a:t>
+              <a:t>4/15/2016</a:t>
             </a:fld>
             <a:endParaRPr lang="en-US"/>
           </a:p>
@@ -12068,7 +12068,7 @@
           <a:p>
             <a:r>
               <a:rPr lang="en-US" dirty="0"/>
-              <a:t>Independent consultant with almost 20 years experience on the MS stack</a:t>
+              <a:t>Independent consultant with almost 20 years experience… C++, .NET, node, little data, big data, just-right data, etc.</a:t>
             </a:r>
           </a:p>
           <a:p>
@@ -12191,8 +12191,20 @@
           <a:p>
             <a:r>
               <a:rPr lang="en-US" dirty="0"/>
-              <a:t>Logical and Physical Topologies</a:t>
-            </a:r>
+              <a:t>App + Cluster Topology</a:t>
+            </a:r>
+          </a:p>
+          <a:p>
+            <a:pPr lvl="1"/>
+            <a:r>
+              <a:rPr lang="en-US" dirty="0"/>
+              <a:t>“My chocolate in </a:t>
+            </a:r>
+            <a:r>
+              <a:rPr lang="en-US"/>
+              <a:t>your peanut butter”</a:t>
+            </a:r>
+            <a:endParaRPr lang="en-US" dirty="0"/>
           </a:p>
           <a:p>
             <a:r>
@@ -12201,16 +12213,10 @@
             </a:r>
           </a:p>
           <a:p>
-            <a:r>
-              <a:rPr lang="en-US" dirty="0"/>
-              <a:t>Reliability</a:t>
-            </a:r>
-          </a:p>
-          <a:p>
-            <a:r>
-              <a:rPr lang="en-US" dirty="0"/>
-              <a:t>Versioning and Upgrades</a:t>
-            </a:r>
+            <a:pPr marL="0" indent="0">
+              <a:buNone/>
+            </a:pPr>
+            <a:endParaRPr lang="en-US" dirty="0"/>
           </a:p>
         </p:txBody>
       </p:sp>

</xml_diff>